<commit_message>
Clarifications in project work
</commit_message>
<xml_diff>
--- a/Project work/Project work, part 4.pptx
+++ b/Project work/Project work, part 4.pptx
@@ -3454,8 +3454,8 @@
         </p:nvSpPr>
         <p:spPr>
           <a:xfrm>
-            <a:off x="742827" y="931240"/>
-            <a:ext cx="3518977" cy="369332"/>
+            <a:off x="558040" y="746574"/>
+            <a:ext cx="2959656" cy="646331"/>
           </a:xfrm>
           <a:prstGeom prst="rect">
             <a:avLst/>
@@ -3470,7 +3470,13 @@
           <a:p>
             <a:r>
               <a:rPr lang="en-GB" dirty="0"/>
-              <a:t>Clicking a point, updates something</a:t>
+              <a:t>Clicking a point selects a site </a:t>
+            </a:r>
+          </a:p>
+          <a:p>
+            <a:r>
+              <a:rPr lang="en-GB" dirty="0"/>
+              <a:t>(for the second page)</a:t>
             </a:r>
           </a:p>
         </p:txBody>
@@ -3620,7 +3626,14 @@
             <a:pPr algn="ctr"/>
             <a:r>
               <a:rPr lang="en-GB" dirty="0"/>
-              <a:t>Histogram of chosen attribute</a:t>
+              <a:t>Histogram or plot with time axis</a:t>
+            </a:r>
+          </a:p>
+          <a:p>
+            <a:pPr algn="ctr"/>
+            <a:r>
+              <a:rPr lang="en-GB" dirty="0"/>
+              <a:t>of chosen attribute</a:t>
             </a:r>
           </a:p>
         </p:txBody>
@@ -4153,7 +4166,7 @@
                   <a:schemeClr val="bg1"/>
                 </a:solidFill>
               </a:rPr>
-              <a:t>Weather type</a:t>
+              <a:t>Weather type selector</a:t>
             </a:r>
           </a:p>
           <a:p>
@@ -4498,7 +4511,7 @@
             <a:pPr algn="ctr"/>
             <a:r>
               <a:rPr lang="en-GB" dirty="0"/>
-              <a:t>ARIMA model predicting chosen lice type with weather as exogeneous data.</a:t>
+              <a:t>ARIMAX model predicting chosen lice type with weather as exogenous data.</a:t>
             </a:r>
           </a:p>
           <a:p>

</xml_diff>